<commit_message>
Change some charts in progress learner
</commit_message>
<xml_diff>
--- a/miscellanous/shape2.pptx
+++ b/miscellanous/shape2.pptx
@@ -267,7 +267,7 @@
           <a:p>
             <a:fld id="{0B9FB5A3-E293-4A93-A517-004E35C7CEF9}" type="datetimeFigureOut">
               <a:rPr lang="en-US" smtClean="0"/>
-              <a:t>5/4/2018</a:t>
+              <a:t>6/22/2018</a:t>
             </a:fld>
             <a:endParaRPr lang="en-US"/>
           </a:p>
@@ -465,7 +465,7 @@
           <a:p>
             <a:fld id="{0B9FB5A3-E293-4A93-A517-004E35C7CEF9}" type="datetimeFigureOut">
               <a:rPr lang="en-US" smtClean="0"/>
-              <a:t>5/4/2018</a:t>
+              <a:t>6/22/2018</a:t>
             </a:fld>
             <a:endParaRPr lang="en-US"/>
           </a:p>
@@ -673,7 +673,7 @@
           <a:p>
             <a:fld id="{0B9FB5A3-E293-4A93-A517-004E35C7CEF9}" type="datetimeFigureOut">
               <a:rPr lang="en-US" smtClean="0"/>
-              <a:t>5/4/2018</a:t>
+              <a:t>6/22/2018</a:t>
             </a:fld>
             <a:endParaRPr lang="en-US"/>
           </a:p>
@@ -871,7 +871,7 @@
           <a:p>
             <a:fld id="{0B9FB5A3-E293-4A93-A517-004E35C7CEF9}" type="datetimeFigureOut">
               <a:rPr lang="en-US" smtClean="0"/>
-              <a:t>5/4/2018</a:t>
+              <a:t>6/22/2018</a:t>
             </a:fld>
             <a:endParaRPr lang="en-US"/>
           </a:p>
@@ -1146,7 +1146,7 @@
           <a:p>
             <a:fld id="{0B9FB5A3-E293-4A93-A517-004E35C7CEF9}" type="datetimeFigureOut">
               <a:rPr lang="en-US" smtClean="0"/>
-              <a:t>5/4/2018</a:t>
+              <a:t>6/22/2018</a:t>
             </a:fld>
             <a:endParaRPr lang="en-US"/>
           </a:p>
@@ -1411,7 +1411,7 @@
           <a:p>
             <a:fld id="{0B9FB5A3-E293-4A93-A517-004E35C7CEF9}" type="datetimeFigureOut">
               <a:rPr lang="en-US" smtClean="0"/>
-              <a:t>5/4/2018</a:t>
+              <a:t>6/22/2018</a:t>
             </a:fld>
             <a:endParaRPr lang="en-US"/>
           </a:p>
@@ -1823,7 +1823,7 @@
           <a:p>
             <a:fld id="{0B9FB5A3-E293-4A93-A517-004E35C7CEF9}" type="datetimeFigureOut">
               <a:rPr lang="en-US" smtClean="0"/>
-              <a:t>5/4/2018</a:t>
+              <a:t>6/22/2018</a:t>
             </a:fld>
             <a:endParaRPr lang="en-US"/>
           </a:p>
@@ -1964,7 +1964,7 @@
           <a:p>
             <a:fld id="{0B9FB5A3-E293-4A93-A517-004E35C7CEF9}" type="datetimeFigureOut">
               <a:rPr lang="en-US" smtClean="0"/>
-              <a:t>5/4/2018</a:t>
+              <a:t>6/22/2018</a:t>
             </a:fld>
             <a:endParaRPr lang="en-US"/>
           </a:p>
@@ -2077,7 +2077,7 @@
           <a:p>
             <a:fld id="{0B9FB5A3-E293-4A93-A517-004E35C7CEF9}" type="datetimeFigureOut">
               <a:rPr lang="en-US" smtClean="0"/>
-              <a:t>5/4/2018</a:t>
+              <a:t>6/22/2018</a:t>
             </a:fld>
             <a:endParaRPr lang="en-US"/>
           </a:p>
@@ -2388,7 +2388,7 @@
           <a:p>
             <a:fld id="{0B9FB5A3-E293-4A93-A517-004E35C7CEF9}" type="datetimeFigureOut">
               <a:rPr lang="en-US" smtClean="0"/>
-              <a:t>5/4/2018</a:t>
+              <a:t>6/22/2018</a:t>
             </a:fld>
             <a:endParaRPr lang="en-US"/>
           </a:p>
@@ -2676,7 +2676,7 @@
           <a:p>
             <a:fld id="{0B9FB5A3-E293-4A93-A517-004E35C7CEF9}" type="datetimeFigureOut">
               <a:rPr lang="en-US" smtClean="0"/>
-              <a:t>5/4/2018</a:t>
+              <a:t>6/22/2018</a:t>
             </a:fld>
             <a:endParaRPr lang="en-US"/>
           </a:p>
@@ -2917,7 +2917,7 @@
           <a:p>
             <a:fld id="{0B9FB5A3-E293-4A93-A517-004E35C7CEF9}" type="datetimeFigureOut">
               <a:rPr lang="en-US" smtClean="0"/>
-              <a:t>5/4/2018</a:t>
+              <a:t>6/22/2018</a:t>
             </a:fld>
             <a:endParaRPr lang="en-US"/>
           </a:p>
@@ -4768,6 +4768,43 @@
               <a:rPr lang="en-US" sz="2400" dirty="0">
                 <a:latin typeface="LM Roman 12" panose="00000500000000000000" pitchFamily="50" charset="0"/>
               </a:rPr>
+              <a:t>3</a:t>
+            </a:r>
+          </a:p>
+        </p:txBody>
+      </p:sp>
+      <p:sp>
+        <p:nvSpPr>
+          <p:cNvPr id="41" name="TextBox 40">
+            <a:extLst>
+              <a:ext uri="{FF2B5EF4-FFF2-40B4-BE49-F238E27FC236}">
+                <a16:creationId xmlns:a16="http://schemas.microsoft.com/office/drawing/2014/main" id="{677EE0EA-E61E-4C98-9A16-391C3365F057}"/>
+              </a:ext>
+            </a:extLst>
+          </p:cNvPr>
+          <p:cNvSpPr txBox="1"/>
+          <p:nvPr/>
+        </p:nvSpPr>
+        <p:spPr>
+          <a:xfrm>
+            <a:off x="3315415" y="2135925"/>
+            <a:ext cx="288758" cy="461665"/>
+          </a:xfrm>
+          <a:prstGeom prst="rect">
+            <a:avLst/>
+          </a:prstGeom>
+          <a:noFill/>
+        </p:spPr>
+        <p:txBody>
+          <a:bodyPr wrap="square" rtlCol="0">
+            <a:spAutoFit/>
+          </a:bodyPr>
+          <a:lstStyle/>
+          <a:p>
+            <a:r>
+              <a:rPr lang="en-US" sz="2400" dirty="0">
+                <a:latin typeface="LM Roman 12" panose="00000500000000000000" pitchFamily="50" charset="0"/>
+              </a:rPr>
               <a:t>4</a:t>
             </a:r>
           </a:p>
@@ -4775,10 +4812,10 @@
       </p:sp>
       <p:sp>
         <p:nvSpPr>
-          <p:cNvPr id="41" name="TextBox 40">
-            <a:extLst>
-              <a:ext uri="{FF2B5EF4-FFF2-40B4-BE49-F238E27FC236}">
-                <a16:creationId xmlns:a16="http://schemas.microsoft.com/office/drawing/2014/main" id="{677EE0EA-E61E-4C98-9A16-391C3365F057}"/>
+          <p:cNvPr id="42" name="TextBox 41">
+            <a:extLst>
+              <a:ext uri="{FF2B5EF4-FFF2-40B4-BE49-F238E27FC236}">
+                <a16:creationId xmlns:a16="http://schemas.microsoft.com/office/drawing/2014/main" id="{44849BC2-7B8F-4282-9AB4-0290E5D8C188}"/>
               </a:ext>
             </a:extLst>
           </p:cNvPr>
@@ -4787,7 +4824,7 @@
         </p:nvSpPr>
         <p:spPr>
           <a:xfrm>
-            <a:off x="3315415" y="2135925"/>
+            <a:off x="3809003" y="1677596"/>
             <a:ext cx="288758" cy="461665"/>
           </a:xfrm>
           <a:prstGeom prst="rect">
@@ -4806,43 +4843,6 @@
                 <a:latin typeface="LM Roman 12" panose="00000500000000000000" pitchFamily="50" charset="0"/>
               </a:rPr>
               <a:t>5</a:t>
-            </a:r>
-          </a:p>
-        </p:txBody>
-      </p:sp>
-      <p:sp>
-        <p:nvSpPr>
-          <p:cNvPr id="42" name="TextBox 41">
-            <a:extLst>
-              <a:ext uri="{FF2B5EF4-FFF2-40B4-BE49-F238E27FC236}">
-                <a16:creationId xmlns:a16="http://schemas.microsoft.com/office/drawing/2014/main" id="{44849BC2-7B8F-4282-9AB4-0290E5D8C188}"/>
-              </a:ext>
-            </a:extLst>
-          </p:cNvPr>
-          <p:cNvSpPr txBox="1"/>
-          <p:nvPr/>
-        </p:nvSpPr>
-        <p:spPr>
-          <a:xfrm>
-            <a:off x="3809003" y="1677596"/>
-            <a:ext cx="288758" cy="461665"/>
-          </a:xfrm>
-          <a:prstGeom prst="rect">
-            <a:avLst/>
-          </a:prstGeom>
-          <a:noFill/>
-        </p:spPr>
-        <p:txBody>
-          <a:bodyPr wrap="square" rtlCol="0">
-            <a:spAutoFit/>
-          </a:bodyPr>
-          <a:lstStyle/>
-          <a:p>
-            <a:r>
-              <a:rPr lang="en-US" sz="2400" dirty="0">
-                <a:latin typeface="LM Roman 12" panose="00000500000000000000" pitchFamily="50" charset="0"/>
-              </a:rPr>
-              <a:t>6</a:t>
             </a:r>
           </a:p>
         </p:txBody>

</xml_diff>

<commit_message>
Add a new learning from scratch video
</commit_message>
<xml_diff>
--- a/miscellanous/shape2.pptx
+++ b/miscellanous/shape2.pptx
@@ -14,6 +14,7 @@
     <p:sldId id="262" r:id="rId8"/>
     <p:sldId id="263" r:id="rId9"/>
     <p:sldId id="264" r:id="rId10"/>
+    <p:sldId id="265" r:id="rId11"/>
   </p:sldIdLst>
   <p:sldSz cx="12192000" cy="6858000"/>
   <p:notesSz cx="6858000" cy="9144000"/>
@@ -267,7 +268,7 @@
           <a:p>
             <a:fld id="{0B9FB5A3-E293-4A93-A517-004E35C7CEF9}" type="datetimeFigureOut">
               <a:rPr lang="en-US" smtClean="0"/>
-              <a:t>6/22/2018</a:t>
+              <a:t>7/18/2018</a:t>
             </a:fld>
             <a:endParaRPr lang="en-US"/>
           </a:p>
@@ -465,7 +466,7 @@
           <a:p>
             <a:fld id="{0B9FB5A3-E293-4A93-A517-004E35C7CEF9}" type="datetimeFigureOut">
               <a:rPr lang="en-US" smtClean="0"/>
-              <a:t>6/22/2018</a:t>
+              <a:t>7/18/2018</a:t>
             </a:fld>
             <a:endParaRPr lang="en-US"/>
           </a:p>
@@ -673,7 +674,7 @@
           <a:p>
             <a:fld id="{0B9FB5A3-E293-4A93-A517-004E35C7CEF9}" type="datetimeFigureOut">
               <a:rPr lang="en-US" smtClean="0"/>
-              <a:t>6/22/2018</a:t>
+              <a:t>7/18/2018</a:t>
             </a:fld>
             <a:endParaRPr lang="en-US"/>
           </a:p>
@@ -871,7 +872,7 @@
           <a:p>
             <a:fld id="{0B9FB5A3-E293-4A93-A517-004E35C7CEF9}" type="datetimeFigureOut">
               <a:rPr lang="en-US" smtClean="0"/>
-              <a:t>6/22/2018</a:t>
+              <a:t>7/18/2018</a:t>
             </a:fld>
             <a:endParaRPr lang="en-US"/>
           </a:p>
@@ -1146,7 +1147,7 @@
           <a:p>
             <a:fld id="{0B9FB5A3-E293-4A93-A517-004E35C7CEF9}" type="datetimeFigureOut">
               <a:rPr lang="en-US" smtClean="0"/>
-              <a:t>6/22/2018</a:t>
+              <a:t>7/18/2018</a:t>
             </a:fld>
             <a:endParaRPr lang="en-US"/>
           </a:p>
@@ -1411,7 +1412,7 @@
           <a:p>
             <a:fld id="{0B9FB5A3-E293-4A93-A517-004E35C7CEF9}" type="datetimeFigureOut">
               <a:rPr lang="en-US" smtClean="0"/>
-              <a:t>6/22/2018</a:t>
+              <a:t>7/18/2018</a:t>
             </a:fld>
             <a:endParaRPr lang="en-US"/>
           </a:p>
@@ -1823,7 +1824,7 @@
           <a:p>
             <a:fld id="{0B9FB5A3-E293-4A93-A517-004E35C7CEF9}" type="datetimeFigureOut">
               <a:rPr lang="en-US" smtClean="0"/>
-              <a:t>6/22/2018</a:t>
+              <a:t>7/18/2018</a:t>
             </a:fld>
             <a:endParaRPr lang="en-US"/>
           </a:p>
@@ -1964,7 +1965,7 @@
           <a:p>
             <a:fld id="{0B9FB5A3-E293-4A93-A517-004E35C7CEF9}" type="datetimeFigureOut">
               <a:rPr lang="en-US" smtClean="0"/>
-              <a:t>6/22/2018</a:t>
+              <a:t>7/18/2018</a:t>
             </a:fld>
             <a:endParaRPr lang="en-US"/>
           </a:p>
@@ -2077,7 +2078,7 @@
           <a:p>
             <a:fld id="{0B9FB5A3-E293-4A93-A517-004E35C7CEF9}" type="datetimeFigureOut">
               <a:rPr lang="en-US" smtClean="0"/>
-              <a:t>6/22/2018</a:t>
+              <a:t>7/18/2018</a:t>
             </a:fld>
             <a:endParaRPr lang="en-US"/>
           </a:p>
@@ -2388,7 +2389,7 @@
           <a:p>
             <a:fld id="{0B9FB5A3-E293-4A93-A517-004E35C7CEF9}" type="datetimeFigureOut">
               <a:rPr lang="en-US" smtClean="0"/>
-              <a:t>6/22/2018</a:t>
+              <a:t>7/18/2018</a:t>
             </a:fld>
             <a:endParaRPr lang="en-US"/>
           </a:p>
@@ -2676,7 +2677,7 @@
           <a:p>
             <a:fld id="{0B9FB5A3-E293-4A93-A517-004E35C7CEF9}" type="datetimeFigureOut">
               <a:rPr lang="en-US" smtClean="0"/>
-              <a:t>6/22/2018</a:t>
+              <a:t>7/18/2018</a:t>
             </a:fld>
             <a:endParaRPr lang="en-US"/>
           </a:p>
@@ -2917,7 +2918,7 @@
           <a:p>
             <a:fld id="{0B9FB5A3-E293-4A93-A517-004E35C7CEF9}" type="datetimeFigureOut">
               <a:rPr lang="en-US" smtClean="0"/>
-              <a:t>6/22/2018</a:t>
+              <a:t>7/18/2018</a:t>
             </a:fld>
             <a:endParaRPr lang="en-US"/>
           </a:p>
@@ -3780,6 +3781,810 @@
 </p:sld>
 </file>
 
+<file path=ppt/slides/slide10.xml><?xml version="1.0" encoding="utf-8"?>
+<p:sld xmlns:a="http://schemas.openxmlformats.org/drawingml/2006/main" xmlns:r="http://schemas.openxmlformats.org/officeDocument/2006/relationships" xmlns:p="http://schemas.openxmlformats.org/presentationml/2006/main">
+  <p:cSld>
+    <p:spTree>
+      <p:nvGrpSpPr>
+        <p:cNvPr id="1" name=""/>
+        <p:cNvGrpSpPr/>
+        <p:nvPr/>
+      </p:nvGrpSpPr>
+      <p:grpSpPr>
+        <a:xfrm>
+          <a:off x="0" y="0"/>
+          <a:ext cx="0" cy="0"/>
+          <a:chOff x="0" y="0"/>
+          <a:chExt cx="0" cy="0"/>
+        </a:xfrm>
+      </p:grpSpPr>
+      <p:sp>
+        <p:nvSpPr>
+          <p:cNvPr id="4" name="Rectangle 3">
+            <a:extLst>
+              <a:ext uri="{FF2B5EF4-FFF2-40B4-BE49-F238E27FC236}">
+                <a16:creationId xmlns:a16="http://schemas.microsoft.com/office/drawing/2014/main" id="{31BB386F-6261-4172-9681-073F3A7BFD64}"/>
+              </a:ext>
+            </a:extLst>
+          </p:cNvPr>
+          <p:cNvSpPr/>
+          <p:nvPr/>
+        </p:nvSpPr>
+        <p:spPr>
+          <a:xfrm>
+            <a:off x="5371690" y="2018539"/>
+            <a:ext cx="2748852" cy="470977"/>
+          </a:xfrm>
+          <a:prstGeom prst="rect">
+            <a:avLst/>
+          </a:prstGeom>
+          <a:ln>
+            <a:solidFill>
+              <a:schemeClr val="bg1">
+                <a:lumMod val="65000"/>
+              </a:schemeClr>
+            </a:solidFill>
+          </a:ln>
+        </p:spPr>
+        <p:style>
+          <a:lnRef idx="2">
+            <a:schemeClr val="dk1"/>
+          </a:lnRef>
+          <a:fillRef idx="1">
+            <a:schemeClr val="lt1"/>
+          </a:fillRef>
+          <a:effectRef idx="0">
+            <a:schemeClr val="dk1"/>
+          </a:effectRef>
+          <a:fontRef idx="minor">
+            <a:schemeClr val="dk1"/>
+          </a:fontRef>
+        </p:style>
+        <p:txBody>
+          <a:bodyPr rtlCol="0" anchor="ctr"/>
+          <a:lstStyle/>
+          <a:p>
+            <a:pPr algn="ctr"/>
+            <a:r>
+              <a:rPr lang="en-US" sz="1200" dirty="0">
+                <a:latin typeface="Times New Roman" panose="02020603050405020304" pitchFamily="18" charset="0"/>
+                <a:cs typeface="Times New Roman" panose="02020603050405020304" pitchFamily="18" charset="0"/>
+              </a:rPr>
+              <a:t>Object recognition/tracking and natural language grounding</a:t>
+            </a:r>
+          </a:p>
+        </p:txBody>
+      </p:sp>
+      <p:pic>
+        <p:nvPicPr>
+          <p:cNvPr id="5" name="Graphic 4" descr="Teacher">
+            <a:extLst>
+              <a:ext uri="{FF2B5EF4-FFF2-40B4-BE49-F238E27FC236}">
+                <a16:creationId xmlns:a16="http://schemas.microsoft.com/office/drawing/2014/main" id="{918FF726-E3F9-49F2-B782-0244F2139017}"/>
+              </a:ext>
+            </a:extLst>
+          </p:cNvPr>
+          <p:cNvPicPr>
+            <a:picLocks noChangeAspect="1"/>
+          </p:cNvPicPr>
+          <p:nvPr/>
+        </p:nvPicPr>
+        <p:blipFill>
+          <a:blip r:embed="rId2">
+            <a:extLst>
+              <a:ext uri="{28A0092B-C50C-407E-A947-70E740481C1C}">
+                <a14:useLocalDpi xmlns:a14="http://schemas.microsoft.com/office/drawing/2010/main" val="0"/>
+              </a:ext>
+              <a:ext uri="{96DAC541-7B7A-43D3-8B79-37D633B846F1}">
+                <asvg:svgBlip xmlns:asvg="http://schemas.microsoft.com/office/drawing/2016/SVG/main" r:embed="rId3"/>
+              </a:ext>
+            </a:extLst>
+          </a:blip>
+          <a:stretch>
+            <a:fillRect/>
+          </a:stretch>
+        </p:blipFill>
+        <p:spPr>
+          <a:xfrm>
+            <a:off x="3392033" y="2682551"/>
+            <a:ext cx="914400" cy="914400"/>
+          </a:xfrm>
+          <a:prstGeom prst="rect">
+            <a:avLst/>
+          </a:prstGeom>
+        </p:spPr>
+      </p:pic>
+      <p:sp>
+        <p:nvSpPr>
+          <p:cNvPr id="6" name="Rectangle 5">
+            <a:extLst>
+              <a:ext uri="{FF2B5EF4-FFF2-40B4-BE49-F238E27FC236}">
+                <a16:creationId xmlns:a16="http://schemas.microsoft.com/office/drawing/2014/main" id="{E116568B-6F24-40BA-BA64-FEFF5183863D}"/>
+              </a:ext>
+            </a:extLst>
+          </p:cNvPr>
+          <p:cNvSpPr/>
+          <p:nvPr/>
+        </p:nvSpPr>
+        <p:spPr>
+          <a:xfrm>
+            <a:off x="5371691" y="2804468"/>
+            <a:ext cx="2748852" cy="645065"/>
+          </a:xfrm>
+          <a:prstGeom prst="rect">
+            <a:avLst/>
+          </a:prstGeom>
+          <a:ln w="28575">
+            <a:solidFill>
+              <a:schemeClr val="tx1"/>
+            </a:solidFill>
+          </a:ln>
+        </p:spPr>
+        <p:style>
+          <a:lnRef idx="2">
+            <a:schemeClr val="dk1"/>
+          </a:lnRef>
+          <a:fillRef idx="1">
+            <a:schemeClr val="lt1"/>
+          </a:fillRef>
+          <a:effectRef idx="0">
+            <a:schemeClr val="dk1"/>
+          </a:effectRef>
+          <a:fontRef idx="minor">
+            <a:schemeClr val="dk1"/>
+          </a:fontRef>
+        </p:style>
+        <p:txBody>
+          <a:bodyPr rtlCol="0" anchor="ctr"/>
+          <a:lstStyle/>
+          <a:p>
+            <a:pPr algn="ctr"/>
+            <a:r>
+              <a:rPr lang="en-US" sz="1200" dirty="0">
+                <a:latin typeface="Times New Roman" panose="02020603050405020304" pitchFamily="18" charset="0"/>
+                <a:cs typeface="Times New Roman" panose="02020603050405020304" pitchFamily="18" charset="0"/>
+              </a:rPr>
+              <a:t>Feature extraction; pattern mining; natural language interaction for verification</a:t>
+            </a:r>
+          </a:p>
+        </p:txBody>
+      </p:sp>
+      <p:sp>
+        <p:nvSpPr>
+          <p:cNvPr id="7" name="Rectangle 6">
+            <a:extLst>
+              <a:ext uri="{FF2B5EF4-FFF2-40B4-BE49-F238E27FC236}">
+                <a16:creationId xmlns:a16="http://schemas.microsoft.com/office/drawing/2014/main" id="{5F2158D6-42DF-43DA-BB53-02FC2AA706BA}"/>
+              </a:ext>
+            </a:extLst>
+          </p:cNvPr>
+          <p:cNvSpPr/>
+          <p:nvPr/>
+        </p:nvSpPr>
+        <p:spPr>
+          <a:xfrm>
+            <a:off x="5371691" y="3802760"/>
+            <a:ext cx="2748852" cy="452032"/>
+          </a:xfrm>
+          <a:prstGeom prst="rect">
+            <a:avLst/>
+          </a:prstGeom>
+          <a:ln>
+            <a:solidFill>
+              <a:schemeClr val="bg1">
+                <a:lumMod val="65000"/>
+              </a:schemeClr>
+            </a:solidFill>
+          </a:ln>
+        </p:spPr>
+        <p:style>
+          <a:lnRef idx="2">
+            <a:schemeClr val="dk1"/>
+          </a:lnRef>
+          <a:fillRef idx="1">
+            <a:schemeClr val="lt1"/>
+          </a:fillRef>
+          <a:effectRef idx="0">
+            <a:schemeClr val="dk1"/>
+          </a:effectRef>
+          <a:fontRef idx="minor">
+            <a:schemeClr val="dk1"/>
+          </a:fontRef>
+        </p:style>
+        <p:txBody>
+          <a:bodyPr rtlCol="0" anchor="ctr"/>
+          <a:lstStyle/>
+          <a:p>
+            <a:pPr algn="ctr"/>
+            <a:r>
+              <a:rPr lang="en-US" sz="1200" dirty="0">
+                <a:latin typeface="Times New Roman" panose="02020603050405020304" pitchFamily="18" charset="0"/>
+                <a:cs typeface="Times New Roman" panose="02020603050405020304" pitchFamily="18" charset="0"/>
+              </a:rPr>
+              <a:t>Action reenactment in novel situations</a:t>
+            </a:r>
+          </a:p>
+        </p:txBody>
+      </p:sp>
+      <p:cxnSp>
+        <p:nvCxnSpPr>
+          <p:cNvPr id="8" name="Straight Arrow Connector 7">
+            <a:extLst>
+              <a:ext uri="{FF2B5EF4-FFF2-40B4-BE49-F238E27FC236}">
+                <a16:creationId xmlns:a16="http://schemas.microsoft.com/office/drawing/2014/main" id="{EB4F615C-E74B-42F6-A2FF-CB247A6F493B}"/>
+              </a:ext>
+            </a:extLst>
+          </p:cNvPr>
+          <p:cNvCxnSpPr>
+            <a:cxnSpLocks/>
+          </p:cNvCxnSpPr>
+          <p:nvPr/>
+        </p:nvCxnSpPr>
+        <p:spPr>
+          <a:xfrm>
+            <a:off x="6746117" y="2538831"/>
+            <a:ext cx="0" cy="235115"/>
+          </a:xfrm>
+          <a:prstGeom prst="straightConnector1">
+            <a:avLst/>
+          </a:prstGeom>
+          <a:ln w="28575">
+            <a:solidFill>
+              <a:schemeClr val="tx1"/>
+            </a:solidFill>
+            <a:tailEnd type="triangle"/>
+          </a:ln>
+        </p:spPr>
+        <p:style>
+          <a:lnRef idx="3">
+            <a:schemeClr val="accent2"/>
+          </a:lnRef>
+          <a:fillRef idx="0">
+            <a:schemeClr val="accent2"/>
+          </a:fillRef>
+          <a:effectRef idx="2">
+            <a:schemeClr val="accent2"/>
+          </a:effectRef>
+          <a:fontRef idx="minor">
+            <a:schemeClr val="tx1"/>
+          </a:fontRef>
+        </p:style>
+      </p:cxnSp>
+      <p:cxnSp>
+        <p:nvCxnSpPr>
+          <p:cNvPr id="9" name="Straight Arrow Connector 8">
+            <a:extLst>
+              <a:ext uri="{FF2B5EF4-FFF2-40B4-BE49-F238E27FC236}">
+                <a16:creationId xmlns:a16="http://schemas.microsoft.com/office/drawing/2014/main" id="{7A37F5A7-AC86-4F49-A3E3-0E50E00E5922}"/>
+              </a:ext>
+            </a:extLst>
+          </p:cNvPr>
+          <p:cNvCxnSpPr>
+            <a:cxnSpLocks/>
+          </p:cNvCxnSpPr>
+          <p:nvPr/>
+        </p:nvCxnSpPr>
+        <p:spPr>
+          <a:xfrm>
+            <a:off x="6746117" y="3490616"/>
+            <a:ext cx="0" cy="246226"/>
+          </a:xfrm>
+          <a:prstGeom prst="straightConnector1">
+            <a:avLst/>
+          </a:prstGeom>
+          <a:ln w="28575">
+            <a:solidFill>
+              <a:schemeClr val="tx1"/>
+            </a:solidFill>
+            <a:tailEnd type="triangle"/>
+          </a:ln>
+        </p:spPr>
+        <p:style>
+          <a:lnRef idx="3">
+            <a:schemeClr val="accent2"/>
+          </a:lnRef>
+          <a:fillRef idx="0">
+            <a:schemeClr val="accent2"/>
+          </a:fillRef>
+          <a:effectRef idx="2">
+            <a:schemeClr val="accent2"/>
+          </a:effectRef>
+          <a:fontRef idx="minor">
+            <a:schemeClr val="tx1"/>
+          </a:fontRef>
+        </p:style>
+      </p:cxnSp>
+      <p:cxnSp>
+        <p:nvCxnSpPr>
+          <p:cNvPr id="10" name="Straight Arrow Connector 9">
+            <a:extLst>
+              <a:ext uri="{FF2B5EF4-FFF2-40B4-BE49-F238E27FC236}">
+                <a16:creationId xmlns:a16="http://schemas.microsoft.com/office/drawing/2014/main" id="{4ECB021B-BD1F-4374-84B6-95D191E24DC0}"/>
+              </a:ext>
+            </a:extLst>
+          </p:cNvPr>
+          <p:cNvCxnSpPr>
+            <a:cxnSpLocks/>
+          </p:cNvCxnSpPr>
+          <p:nvPr/>
+        </p:nvCxnSpPr>
+        <p:spPr>
+          <a:xfrm flipH="1">
+            <a:off x="4367981" y="3008995"/>
+            <a:ext cx="1003710" cy="0"/>
+          </a:xfrm>
+          <a:prstGeom prst="straightConnector1">
+            <a:avLst/>
+          </a:prstGeom>
+          <a:ln w="28575">
+            <a:solidFill>
+              <a:schemeClr val="tx1"/>
+            </a:solidFill>
+            <a:tailEnd type="triangle"/>
+          </a:ln>
+        </p:spPr>
+        <p:style>
+          <a:lnRef idx="3">
+            <a:schemeClr val="accent2"/>
+          </a:lnRef>
+          <a:fillRef idx="0">
+            <a:schemeClr val="accent2"/>
+          </a:fillRef>
+          <a:effectRef idx="2">
+            <a:schemeClr val="accent2"/>
+          </a:effectRef>
+          <a:fontRef idx="minor">
+            <a:schemeClr val="tx1"/>
+          </a:fontRef>
+        </p:style>
+      </p:cxnSp>
+      <p:cxnSp>
+        <p:nvCxnSpPr>
+          <p:cNvPr id="12" name="Straight Arrow Connector 11">
+            <a:extLst>
+              <a:ext uri="{FF2B5EF4-FFF2-40B4-BE49-F238E27FC236}">
+                <a16:creationId xmlns:a16="http://schemas.microsoft.com/office/drawing/2014/main" id="{019BBC6E-C3C8-45AC-A213-5E72CD7783D9}"/>
+              </a:ext>
+            </a:extLst>
+          </p:cNvPr>
+          <p:cNvCxnSpPr>
+            <a:cxnSpLocks/>
+          </p:cNvCxnSpPr>
+          <p:nvPr/>
+        </p:nvCxnSpPr>
+        <p:spPr>
+          <a:xfrm>
+            <a:off x="4367981" y="3242015"/>
+            <a:ext cx="1003710" cy="0"/>
+          </a:xfrm>
+          <a:prstGeom prst="straightConnector1">
+            <a:avLst/>
+          </a:prstGeom>
+          <a:ln w="28575">
+            <a:solidFill>
+              <a:schemeClr val="tx1"/>
+            </a:solidFill>
+            <a:tailEnd type="triangle"/>
+          </a:ln>
+        </p:spPr>
+        <p:style>
+          <a:lnRef idx="3">
+            <a:schemeClr val="accent2"/>
+          </a:lnRef>
+          <a:fillRef idx="0">
+            <a:schemeClr val="accent2"/>
+          </a:fillRef>
+          <a:effectRef idx="2">
+            <a:schemeClr val="accent2"/>
+          </a:effectRef>
+          <a:fontRef idx="minor">
+            <a:schemeClr val="tx1"/>
+          </a:fontRef>
+        </p:style>
+      </p:cxnSp>
+      <p:cxnSp>
+        <p:nvCxnSpPr>
+          <p:cNvPr id="19" name="Connector: Elbow 18">
+            <a:extLst>
+              <a:ext uri="{FF2B5EF4-FFF2-40B4-BE49-F238E27FC236}">
+                <a16:creationId xmlns:a16="http://schemas.microsoft.com/office/drawing/2014/main" id="{FFB81D51-ED02-4CD4-A348-C5D4D5F228E2}"/>
+              </a:ext>
+            </a:extLst>
+          </p:cNvPr>
+          <p:cNvCxnSpPr>
+            <a:cxnSpLocks/>
+            <a:endCxn id="4" idx="1"/>
+          </p:cNvCxnSpPr>
+          <p:nvPr/>
+        </p:nvCxnSpPr>
+        <p:spPr>
+          <a:xfrm flipV="1">
+            <a:off x="3849232" y="2254028"/>
+            <a:ext cx="1522458" cy="537664"/>
+          </a:xfrm>
+          <a:prstGeom prst="bentConnector3">
+            <a:avLst>
+              <a:gd name="adj1" fmla="val -142"/>
+            </a:avLst>
+          </a:prstGeom>
+          <a:ln w="12700">
+            <a:solidFill>
+              <a:schemeClr val="bg1">
+                <a:lumMod val="65000"/>
+              </a:schemeClr>
+            </a:solidFill>
+            <a:tailEnd type="triangle"/>
+          </a:ln>
+        </p:spPr>
+        <p:style>
+          <a:lnRef idx="1">
+            <a:schemeClr val="accent1"/>
+          </a:lnRef>
+          <a:fillRef idx="0">
+            <a:schemeClr val="accent1"/>
+          </a:fillRef>
+          <a:effectRef idx="0">
+            <a:schemeClr val="accent1"/>
+          </a:effectRef>
+          <a:fontRef idx="minor">
+            <a:schemeClr val="tx1"/>
+          </a:fontRef>
+        </p:style>
+      </p:cxnSp>
+      <p:cxnSp>
+        <p:nvCxnSpPr>
+          <p:cNvPr id="22" name="Connector: Elbow 21">
+            <a:extLst>
+              <a:ext uri="{FF2B5EF4-FFF2-40B4-BE49-F238E27FC236}">
+                <a16:creationId xmlns:a16="http://schemas.microsoft.com/office/drawing/2014/main" id="{A9F72757-AACA-4A78-91BC-10F6CC443B5C}"/>
+              </a:ext>
+            </a:extLst>
+          </p:cNvPr>
+          <p:cNvCxnSpPr>
+            <a:cxnSpLocks/>
+            <a:endCxn id="7" idx="1"/>
+          </p:cNvCxnSpPr>
+          <p:nvPr/>
+        </p:nvCxnSpPr>
+        <p:spPr>
+          <a:xfrm>
+            <a:off x="4069450" y="3615985"/>
+            <a:ext cx="1302241" cy="412791"/>
+          </a:xfrm>
+          <a:prstGeom prst="bentConnector3">
+            <a:avLst>
+              <a:gd name="adj1" fmla="val -247"/>
+            </a:avLst>
+          </a:prstGeom>
+          <a:ln w="12700">
+            <a:solidFill>
+              <a:schemeClr val="bg1">
+                <a:lumMod val="65000"/>
+              </a:schemeClr>
+            </a:solidFill>
+            <a:headEnd type="triangle" w="med" len="med"/>
+            <a:tailEnd type="none" w="med" len="med"/>
+          </a:ln>
+        </p:spPr>
+        <p:style>
+          <a:lnRef idx="1">
+            <a:schemeClr val="accent1"/>
+          </a:lnRef>
+          <a:fillRef idx="0">
+            <a:schemeClr val="accent1"/>
+          </a:fillRef>
+          <a:effectRef idx="0">
+            <a:schemeClr val="accent1"/>
+          </a:effectRef>
+          <a:fontRef idx="minor">
+            <a:schemeClr val="tx1"/>
+          </a:fontRef>
+        </p:style>
+      </p:cxnSp>
+      <p:cxnSp>
+        <p:nvCxnSpPr>
+          <p:cNvPr id="29" name="Connector: Elbow 28">
+            <a:extLst>
+              <a:ext uri="{FF2B5EF4-FFF2-40B4-BE49-F238E27FC236}">
+                <a16:creationId xmlns:a16="http://schemas.microsoft.com/office/drawing/2014/main" id="{6AF4C120-9351-4FDC-BAAB-2487C42314C9}"/>
+              </a:ext>
+            </a:extLst>
+          </p:cNvPr>
+          <p:cNvCxnSpPr>
+            <a:cxnSpLocks/>
+            <a:endCxn id="5" idx="2"/>
+          </p:cNvCxnSpPr>
+          <p:nvPr/>
+        </p:nvCxnSpPr>
+        <p:spPr>
+          <a:xfrm rot="10800000">
+            <a:off x="3849233" y="3596951"/>
+            <a:ext cx="1522458" cy="533536"/>
+          </a:xfrm>
+          <a:prstGeom prst="bentConnector2">
+            <a:avLst/>
+          </a:prstGeom>
+          <a:ln w="12700">
+            <a:solidFill>
+              <a:schemeClr val="bg1">
+                <a:lumMod val="65000"/>
+              </a:schemeClr>
+            </a:solidFill>
+            <a:headEnd type="arrow" w="med" len="med"/>
+            <a:tailEnd type="none" w="med" len="med"/>
+          </a:ln>
+        </p:spPr>
+        <p:style>
+          <a:lnRef idx="1">
+            <a:schemeClr val="accent1"/>
+          </a:lnRef>
+          <a:fillRef idx="0">
+            <a:schemeClr val="accent1"/>
+          </a:fillRef>
+          <a:effectRef idx="0">
+            <a:schemeClr val="accent1"/>
+          </a:effectRef>
+          <a:fontRef idx="minor">
+            <a:schemeClr val="tx1"/>
+          </a:fontRef>
+        </p:style>
+      </p:cxnSp>
+      <p:sp>
+        <p:nvSpPr>
+          <p:cNvPr id="32" name="TextBox 31">
+            <a:extLst>
+              <a:ext uri="{FF2B5EF4-FFF2-40B4-BE49-F238E27FC236}">
+                <a16:creationId xmlns:a16="http://schemas.microsoft.com/office/drawing/2014/main" id="{7F16A37C-65E6-4D7B-94DB-7536A207B86A}"/>
+              </a:ext>
+            </a:extLst>
+          </p:cNvPr>
+          <p:cNvSpPr txBox="1"/>
+          <p:nvPr/>
+        </p:nvSpPr>
+        <p:spPr>
+          <a:xfrm>
+            <a:off x="3897862" y="2001678"/>
+            <a:ext cx="1160895" cy="276999"/>
+          </a:xfrm>
+          <a:prstGeom prst="rect">
+            <a:avLst/>
+          </a:prstGeom>
+          <a:noFill/>
+        </p:spPr>
+        <p:txBody>
+          <a:bodyPr wrap="none" rtlCol="0">
+            <a:spAutoFit/>
+          </a:bodyPr>
+          <a:lstStyle/>
+          <a:p>
+            <a:r>
+              <a:rPr lang="en-US" sz="1200" dirty="0">
+                <a:latin typeface="Times New Roman" panose="02020603050405020304" pitchFamily="18" charset="0"/>
+                <a:cs typeface="Times New Roman" panose="02020603050405020304" pitchFamily="18" charset="0"/>
+              </a:rPr>
+              <a:t>Demonstrations</a:t>
+            </a:r>
+          </a:p>
+        </p:txBody>
+      </p:sp>
+      <p:sp>
+        <p:nvSpPr>
+          <p:cNvPr id="33" name="TextBox 32">
+            <a:extLst>
+              <a:ext uri="{FF2B5EF4-FFF2-40B4-BE49-F238E27FC236}">
+                <a16:creationId xmlns:a16="http://schemas.microsoft.com/office/drawing/2014/main" id="{A2431F3B-B491-42E2-9F55-848E8CB3EF56}"/>
+              </a:ext>
+            </a:extLst>
+          </p:cNvPr>
+          <p:cNvSpPr txBox="1"/>
+          <p:nvPr/>
+        </p:nvSpPr>
+        <p:spPr>
+          <a:xfrm>
+            <a:off x="4030027" y="3747065"/>
+            <a:ext cx="973343" cy="276999"/>
+          </a:xfrm>
+          <a:prstGeom prst="rect">
+            <a:avLst/>
+          </a:prstGeom>
+          <a:noFill/>
+        </p:spPr>
+        <p:txBody>
+          <a:bodyPr wrap="none" rtlCol="0">
+            <a:spAutoFit/>
+          </a:bodyPr>
+          <a:lstStyle/>
+          <a:p>
+            <a:r>
+              <a:rPr lang="en-US" sz="1200" dirty="0">
+                <a:latin typeface="Times New Roman" panose="02020603050405020304" pitchFamily="18" charset="0"/>
+                <a:cs typeface="Times New Roman" panose="02020603050405020304" pitchFamily="18" charset="0"/>
+              </a:rPr>
+              <a:t>Performance</a:t>
+            </a:r>
+          </a:p>
+        </p:txBody>
+      </p:sp>
+      <p:sp>
+        <p:nvSpPr>
+          <p:cNvPr id="34" name="TextBox 33">
+            <a:extLst>
+              <a:ext uri="{FF2B5EF4-FFF2-40B4-BE49-F238E27FC236}">
+                <a16:creationId xmlns:a16="http://schemas.microsoft.com/office/drawing/2014/main" id="{6C4619F5-155B-4345-A222-A7284B84EC37}"/>
+              </a:ext>
+            </a:extLst>
+          </p:cNvPr>
+          <p:cNvSpPr txBox="1"/>
+          <p:nvPr/>
+        </p:nvSpPr>
+        <p:spPr>
+          <a:xfrm>
+            <a:off x="4050568" y="4063705"/>
+            <a:ext cx="776175" cy="276999"/>
+          </a:xfrm>
+          <a:prstGeom prst="rect">
+            <a:avLst/>
+          </a:prstGeom>
+          <a:noFill/>
+        </p:spPr>
+        <p:txBody>
+          <a:bodyPr wrap="none" rtlCol="0">
+            <a:spAutoFit/>
+          </a:bodyPr>
+          <a:lstStyle/>
+          <a:p>
+            <a:r>
+              <a:rPr lang="en-US" sz="1200" dirty="0">
+                <a:latin typeface="Times New Roman" panose="02020603050405020304" pitchFamily="18" charset="0"/>
+                <a:cs typeface="Times New Roman" panose="02020603050405020304" pitchFamily="18" charset="0"/>
+              </a:rPr>
+              <a:t>Feedback</a:t>
+            </a:r>
+          </a:p>
+        </p:txBody>
+      </p:sp>
+      <p:sp>
+        <p:nvSpPr>
+          <p:cNvPr id="51" name="TextBox 50">
+            <a:extLst>
+              <a:ext uri="{FF2B5EF4-FFF2-40B4-BE49-F238E27FC236}">
+                <a16:creationId xmlns:a16="http://schemas.microsoft.com/office/drawing/2014/main" id="{8EE55153-23AF-41F7-B27A-C93DB089CC7F}"/>
+              </a:ext>
+            </a:extLst>
+          </p:cNvPr>
+          <p:cNvSpPr txBox="1"/>
+          <p:nvPr/>
+        </p:nvSpPr>
+        <p:spPr>
+          <a:xfrm>
+            <a:off x="4449371" y="2748580"/>
+            <a:ext cx="779381" cy="276999"/>
+          </a:xfrm>
+          <a:prstGeom prst="rect">
+            <a:avLst/>
+          </a:prstGeom>
+          <a:noFill/>
+        </p:spPr>
+        <p:txBody>
+          <a:bodyPr wrap="none" rtlCol="0">
+            <a:spAutoFit/>
+          </a:bodyPr>
+          <a:lstStyle/>
+          <a:p>
+            <a:r>
+              <a:rPr lang="en-US" sz="1200" dirty="0">
+                <a:latin typeface="Times New Roman" panose="02020603050405020304" pitchFamily="18" charset="0"/>
+                <a:cs typeface="Times New Roman" panose="02020603050405020304" pitchFamily="18" charset="0"/>
+              </a:rPr>
+              <a:t>Question </a:t>
+            </a:r>
+          </a:p>
+        </p:txBody>
+      </p:sp>
+      <p:sp>
+        <p:nvSpPr>
+          <p:cNvPr id="52" name="TextBox 51">
+            <a:extLst>
+              <a:ext uri="{FF2B5EF4-FFF2-40B4-BE49-F238E27FC236}">
+                <a16:creationId xmlns:a16="http://schemas.microsoft.com/office/drawing/2014/main" id="{EBFC299C-D791-4251-BB09-ABF0756F1266}"/>
+              </a:ext>
+            </a:extLst>
+          </p:cNvPr>
+          <p:cNvSpPr txBox="1"/>
+          <p:nvPr/>
+        </p:nvSpPr>
+        <p:spPr>
+          <a:xfrm>
+            <a:off x="4391740" y="3217104"/>
+            <a:ext cx="1055097" cy="276999"/>
+          </a:xfrm>
+          <a:prstGeom prst="rect">
+            <a:avLst/>
+          </a:prstGeom>
+          <a:noFill/>
+        </p:spPr>
+        <p:txBody>
+          <a:bodyPr wrap="none" rtlCol="0">
+            <a:spAutoFit/>
+          </a:bodyPr>
+          <a:lstStyle/>
+          <a:p>
+            <a:r>
+              <a:rPr lang="en-US" sz="1200" dirty="0">
+                <a:latin typeface="Times New Roman" panose="02020603050405020304" pitchFamily="18" charset="0"/>
+                <a:cs typeface="Times New Roman" panose="02020603050405020304" pitchFamily="18" charset="0"/>
+              </a:rPr>
+              <a:t>Confirmation </a:t>
+            </a:r>
+          </a:p>
+        </p:txBody>
+      </p:sp>
+      <p:sp>
+        <p:nvSpPr>
+          <p:cNvPr id="53" name="Rectangle 52">
+            <a:extLst>
+              <a:ext uri="{FF2B5EF4-FFF2-40B4-BE49-F238E27FC236}">
+                <a16:creationId xmlns:a16="http://schemas.microsoft.com/office/drawing/2014/main" id="{AC03B2E7-88B9-4B6F-872A-B50D54F648DF}"/>
+              </a:ext>
+            </a:extLst>
+          </p:cNvPr>
+          <p:cNvSpPr/>
+          <p:nvPr/>
+        </p:nvSpPr>
+        <p:spPr>
+          <a:xfrm>
+            <a:off x="4361855" y="2523217"/>
+            <a:ext cx="3812651" cy="1221572"/>
+          </a:xfrm>
+          <a:prstGeom prst="rect">
+            <a:avLst/>
+          </a:prstGeom>
+          <a:noFill/>
+          <a:ln w="9525">
+            <a:solidFill>
+              <a:schemeClr val="tx1"/>
+            </a:solidFill>
+            <a:prstDash val="dash"/>
+          </a:ln>
+        </p:spPr>
+        <p:style>
+          <a:lnRef idx="2">
+            <a:schemeClr val="accent1">
+              <a:shade val="50000"/>
+            </a:schemeClr>
+          </a:lnRef>
+          <a:fillRef idx="1">
+            <a:schemeClr val="accent1"/>
+          </a:fillRef>
+          <a:effectRef idx="0">
+            <a:schemeClr val="accent1"/>
+          </a:effectRef>
+          <a:fontRef idx="minor">
+            <a:schemeClr val="lt1"/>
+          </a:fontRef>
+        </p:style>
+        <p:txBody>
+          <a:bodyPr rtlCol="0" anchor="ctr"/>
+          <a:lstStyle/>
+          <a:p>
+            <a:pPr algn="ctr"/>
+            <a:endParaRPr lang="en-US" dirty="0"/>
+          </a:p>
+        </p:txBody>
+      </p:sp>
+    </p:spTree>
+    <p:extLst>
+      <p:ext uri="{BB962C8B-B14F-4D97-AF65-F5344CB8AC3E}">
+        <p14:creationId xmlns:p14="http://schemas.microsoft.com/office/powerpoint/2010/main" val="865170030"/>
+      </p:ext>
+    </p:extLst>
+  </p:cSld>
+  <p:clrMapOvr>
+    <a:masterClrMapping/>
+  </p:clrMapOvr>
+</p:sld>
+</file>
+
 <file path=ppt/slides/slide2.xml><?xml version="1.0" encoding="utf-8"?>
 <p:sld xmlns:a="http://schemas.openxmlformats.org/drawingml/2006/main" xmlns:r="http://schemas.openxmlformats.org/officeDocument/2006/relationships" xmlns:p="http://schemas.openxmlformats.org/presentationml/2006/main">
   <p:cSld>

</xml_diff>